<commit_message>
Refactor: Changed folder structure
</commit_message>
<xml_diff>
--- a/Documentation/Webs – Workflow case - design.pptx
+++ b/Documentation/Webs – Workflow case - design.pptx
@@ -107,6 +107,11 @@
       </a:defRPr>
     </a:lvl9pPr>
   </p:defaultTextStyle>
+  <p:extLst>
+    <p:ext uri="{EFAFB233-063F-42B5-8137-9DF3F51BA10A}">
+      <p15:sldGuideLst xmlns:p15="http://schemas.microsoft.com/office/powerpoint/2012/main"/>
+    </p:ext>
+  </p:extLst>
 </p:presentation>
 </file>
 

</xml_diff>

<commit_message>
Features: powerpoint and workflow exports
</commit_message>
<xml_diff>
--- a/Documentation/Webs – Workflow case - design.pptx
+++ b/Documentation/Webs – Workflow case - design.pptx
@@ -9,6 +9,10 @@
     <p:sldId id="257" r:id="rId3"/>
     <p:sldId id="258" r:id="rId4"/>
     <p:sldId id="259" r:id="rId5"/>
+    <p:sldId id="260" r:id="rId6"/>
+    <p:sldId id="261" r:id="rId7"/>
+    <p:sldId id="262" r:id="rId8"/>
+    <p:sldId id="263" r:id="rId9"/>
   </p:sldIdLst>
   <p:sldSz cx="12192000" cy="6858000"/>
   <p:notesSz cx="6858000" cy="9144000"/>
@@ -3517,7 +3521,7 @@
         </p:nvSpPr>
         <p:spPr>
           <a:xfrm>
-            <a:off x="838200" y="2326229"/>
+            <a:off x="768284" y="2257938"/>
             <a:ext cx="2856322" cy="4166646"/>
           </a:xfrm>
           <a:prstGeom prst="rect">
@@ -3986,8 +3990,8 @@
         </p:nvCxnSpPr>
         <p:spPr>
           <a:xfrm flipH="1">
-            <a:off x="2102177" y="3419301"/>
-            <a:ext cx="1970202" cy="344409"/>
+            <a:off x="2196445" y="3419301"/>
+            <a:ext cx="1875934" cy="1097072"/>
           </a:xfrm>
           <a:prstGeom prst="straightConnector1">
             <a:avLst/>
@@ -4026,9 +4030,9 @@
           <p:nvPr/>
         </p:nvCxnSpPr>
         <p:spPr>
-          <a:xfrm flipH="1">
-            <a:off x="2102177" y="4741421"/>
-            <a:ext cx="1970202" cy="0"/>
+          <a:xfrm flipH="1" flipV="1">
+            <a:off x="2196445" y="3563332"/>
+            <a:ext cx="1875934" cy="1178089"/>
           </a:xfrm>
           <a:prstGeom prst="straightConnector1">
             <a:avLst/>
@@ -4133,7 +4137,7 @@
         <p:spPr>
           <a:xfrm>
             <a:off x="6833647" y="5501254"/>
-            <a:ext cx="3111631" cy="646331"/>
+            <a:ext cx="4365396" cy="923330"/>
           </a:xfrm>
           <a:prstGeom prst="rect">
             <a:avLst/>
@@ -4148,11 +4152,73 @@
           <a:p>
             <a:r>
               <a:rPr lang="en-GB" dirty="0"/>
-              <a:t>Need to be possible to execute the same step multiple times</a:t>
-            </a:r>
-          </a:p>
-        </p:txBody>
-      </p:sp>
+              <a:t>Needs:</a:t>
+            </a:r>
+          </a:p>
+          <a:p>
+            <a:pPr marL="285750" indent="-285750">
+              <a:buFont typeface="Arial" panose="020B0604020202020204" pitchFamily="34" charset="0"/>
+              <a:buChar char="•"/>
+            </a:pPr>
+            <a:r>
+              <a:rPr lang="en-GB" dirty="0"/>
+              <a:t>Execute the same step multiple times</a:t>
+            </a:r>
+          </a:p>
+          <a:p>
+            <a:pPr marL="285750" indent="-285750">
+              <a:buFont typeface="Arial" panose="020B0604020202020204" pitchFamily="34" charset="0"/>
+              <a:buChar char="•"/>
+            </a:pPr>
+            <a:r>
+              <a:rPr lang="en-GB" dirty="0"/>
+              <a:t>Add data to the workflow</a:t>
+            </a:r>
+          </a:p>
+        </p:txBody>
+      </p:sp>
+      <p:cxnSp>
+        <p:nvCxnSpPr>
+          <p:cNvPr id="21" name="Straight Arrow Connector 20">
+            <a:extLst>
+              <a:ext uri="{FF2B5EF4-FFF2-40B4-BE49-F238E27FC236}">
+                <a16:creationId xmlns:a16="http://schemas.microsoft.com/office/drawing/2014/main" id="{ADE0A58E-B97E-0740-3966-79A624B83511}"/>
+              </a:ext>
+            </a:extLst>
+          </p:cNvPr>
+          <p:cNvCxnSpPr>
+            <a:cxnSpLocks/>
+            <a:stCxn id="8" idx="1"/>
+          </p:cNvCxnSpPr>
+          <p:nvPr/>
+        </p:nvCxnSpPr>
+        <p:spPr>
+          <a:xfrm flipH="1">
+            <a:off x="2196445" y="3419301"/>
+            <a:ext cx="1875934" cy="1787879"/>
+          </a:xfrm>
+          <a:prstGeom prst="straightConnector1">
+            <a:avLst/>
+          </a:prstGeom>
+          <a:ln>
+            <a:tailEnd type="triangle"/>
+          </a:ln>
+        </p:spPr>
+        <p:style>
+          <a:lnRef idx="1">
+            <a:schemeClr val="accent1"/>
+          </a:lnRef>
+          <a:fillRef idx="0">
+            <a:schemeClr val="accent1"/>
+          </a:fillRef>
+          <a:effectRef idx="0">
+            <a:schemeClr val="accent1"/>
+          </a:effectRef>
+          <a:fontRef idx="minor">
+            <a:schemeClr val="tx1"/>
+          </a:fontRef>
+        </p:style>
+      </p:cxnSp>
     </p:spTree>
     <p:extLst>
       <p:ext uri="{BB962C8B-B14F-4D97-AF65-F5344CB8AC3E}">
@@ -4246,7 +4312,13 @@
           <a:p>
             <a:r>
               <a:rPr lang="en-GB" dirty="0"/>
-              <a:t>Store data in a smart and reliable way</a:t>
+              <a:t>Store data in a smart and reliable way </a:t>
+            </a:r>
+          </a:p>
+          <a:p>
+            <a:r>
+              <a:rPr lang="en-GB" dirty="0"/>
+              <a:t>Easy to add workflow steps and workflows -&gt; modular</a:t>
             </a:r>
           </a:p>
           <a:p>
@@ -4310,9 +4382,204 @@
           <a:p>
             <a:r>
               <a:rPr lang="en-GB" dirty="0"/>
-              <a:t>Use standardized classes</a:t>
+              <a:t>Use standardized classes and methods</a:t>
             </a:r>
             <a:endParaRPr lang="en-NL" dirty="0"/>
+          </a:p>
+        </p:txBody>
+      </p:sp>
+      <p:sp>
+        <p:nvSpPr>
+          <p:cNvPr id="3" name="Rectangle 2">
+            <a:extLst>
+              <a:ext uri="{FF2B5EF4-FFF2-40B4-BE49-F238E27FC236}">
+                <a16:creationId xmlns:a16="http://schemas.microsoft.com/office/drawing/2014/main" id="{424EE509-96EB-CBAD-25C7-FCCCCFB33806}"/>
+              </a:ext>
+            </a:extLst>
+          </p:cNvPr>
+          <p:cNvSpPr/>
+          <p:nvPr/>
+        </p:nvSpPr>
+        <p:spPr>
+          <a:xfrm>
+            <a:off x="697584" y="1932495"/>
+            <a:ext cx="2630078" cy="4487159"/>
+          </a:xfrm>
+          <a:prstGeom prst="rect">
+            <a:avLst/>
+          </a:prstGeom>
+        </p:spPr>
+        <p:style>
+          <a:lnRef idx="2">
+            <a:schemeClr val="accent1">
+              <a:shade val="50000"/>
+            </a:schemeClr>
+          </a:lnRef>
+          <a:fillRef idx="1">
+            <a:schemeClr val="accent1"/>
+          </a:fillRef>
+          <a:effectRef idx="0">
+            <a:schemeClr val="accent1"/>
+          </a:effectRef>
+          <a:fontRef idx="minor">
+            <a:schemeClr val="lt1"/>
+          </a:fontRef>
+        </p:style>
+        <p:txBody>
+          <a:bodyPr rtlCol="0" anchor="ctr"/>
+          <a:lstStyle/>
+          <a:p>
+            <a:pPr algn="ctr"/>
+            <a:r>
+              <a:rPr lang="en-GB" dirty="0"/>
+              <a:t>Generic class </a:t>
+            </a:r>
+          </a:p>
+          <a:p>
+            <a:pPr algn="ctr"/>
+            <a:endParaRPr lang="en-GB" dirty="0"/>
+          </a:p>
+          <a:p>
+            <a:pPr marL="285750" indent="-285750" algn="ctr">
+              <a:buFontTx/>
+              <a:buChar char="-"/>
+            </a:pPr>
+            <a:r>
+              <a:rPr lang="en-GB" dirty="0"/>
+              <a:t>Generic run and validate method (standard logging)</a:t>
+            </a:r>
+          </a:p>
+          <a:p>
+            <a:pPr marL="285750" indent="-285750" algn="ctr">
+              <a:buFontTx/>
+              <a:buChar char="-"/>
+            </a:pPr>
+            <a:r>
+              <a:rPr lang="en-GB" dirty="0"/>
+              <a:t>Framework for specific </a:t>
+            </a:r>
+            <a:r>
+              <a:rPr lang="en-GB" dirty="0" err="1"/>
+              <a:t>workstep</a:t>
+            </a:r>
+            <a:r>
+              <a:rPr lang="en-GB" dirty="0"/>
+              <a:t> classes</a:t>
+            </a:r>
+          </a:p>
+        </p:txBody>
+      </p:sp>
+      <p:cxnSp>
+        <p:nvCxnSpPr>
+          <p:cNvPr id="5" name="Straight Arrow Connector 4">
+            <a:extLst>
+              <a:ext uri="{FF2B5EF4-FFF2-40B4-BE49-F238E27FC236}">
+                <a16:creationId xmlns:a16="http://schemas.microsoft.com/office/drawing/2014/main" id="{39604DCA-ED73-8F06-4882-B80B54756C25}"/>
+              </a:ext>
+            </a:extLst>
+          </p:cNvPr>
+          <p:cNvCxnSpPr>
+            <a:cxnSpLocks/>
+          </p:cNvCxnSpPr>
+          <p:nvPr/>
+        </p:nvCxnSpPr>
+        <p:spPr>
+          <a:xfrm>
+            <a:off x="3601039" y="4279769"/>
+            <a:ext cx="3591613" cy="0"/>
+          </a:xfrm>
+          <a:prstGeom prst="straightConnector1">
+            <a:avLst/>
+          </a:prstGeom>
+          <a:ln>
+            <a:tailEnd type="triangle"/>
+          </a:ln>
+        </p:spPr>
+        <p:style>
+          <a:lnRef idx="1">
+            <a:schemeClr val="accent1"/>
+          </a:lnRef>
+          <a:fillRef idx="0">
+            <a:schemeClr val="accent1"/>
+          </a:fillRef>
+          <a:effectRef idx="0">
+            <a:schemeClr val="accent1"/>
+          </a:effectRef>
+          <a:fontRef idx="minor">
+            <a:schemeClr val="tx1"/>
+          </a:fontRef>
+        </p:style>
+      </p:cxnSp>
+      <p:sp>
+        <p:nvSpPr>
+          <p:cNvPr id="6" name="Rectangle 5">
+            <a:extLst>
+              <a:ext uri="{FF2B5EF4-FFF2-40B4-BE49-F238E27FC236}">
+                <a16:creationId xmlns:a16="http://schemas.microsoft.com/office/drawing/2014/main" id="{67749471-D269-FEC8-2D91-BA01AD3141A5}"/>
+              </a:ext>
+            </a:extLst>
+          </p:cNvPr>
+          <p:cNvSpPr/>
+          <p:nvPr/>
+        </p:nvSpPr>
+        <p:spPr>
+          <a:xfrm>
+            <a:off x="7549301" y="1932494"/>
+            <a:ext cx="2630078" cy="4487159"/>
+          </a:xfrm>
+          <a:prstGeom prst="rect">
+            <a:avLst/>
+          </a:prstGeom>
+        </p:spPr>
+        <p:style>
+          <a:lnRef idx="2">
+            <a:schemeClr val="accent1">
+              <a:shade val="50000"/>
+            </a:schemeClr>
+          </a:lnRef>
+          <a:fillRef idx="1">
+            <a:schemeClr val="accent1"/>
+          </a:fillRef>
+          <a:effectRef idx="0">
+            <a:schemeClr val="accent1"/>
+          </a:effectRef>
+          <a:fontRef idx="minor">
+            <a:schemeClr val="lt1"/>
+          </a:fontRef>
+        </p:style>
+        <p:txBody>
+          <a:bodyPr rtlCol="0" anchor="ctr"/>
+          <a:lstStyle/>
+          <a:p>
+            <a:pPr algn="ctr"/>
+            <a:r>
+              <a:rPr lang="en-GB" dirty="0"/>
+              <a:t>Workflow specific class </a:t>
+            </a:r>
+          </a:p>
+          <a:p>
+            <a:pPr algn="ctr"/>
+            <a:endParaRPr lang="en-GB" dirty="0"/>
+          </a:p>
+          <a:p>
+            <a:pPr marL="285750" indent="-285750" algn="ctr">
+              <a:buFontTx/>
+              <a:buChar char="-"/>
+            </a:pPr>
+            <a:r>
+              <a:rPr lang="en-GB" dirty="0"/>
+              <a:t>Always a validate and execute method</a:t>
+            </a:r>
+          </a:p>
+          <a:p>
+            <a:pPr marL="285750" indent="-285750" algn="ctr">
+              <a:buFontTx/>
+              <a:buChar char="-"/>
+            </a:pPr>
+            <a:r>
+              <a:rPr lang="en-GB" dirty="0"/>
+              <a:t>If a step is complicated break it down in multiple methods</a:t>
+            </a:r>
           </a:p>
         </p:txBody>
       </p:sp>
@@ -4320,6 +4587,1295 @@
     <p:extLst>
       <p:ext uri="{BB962C8B-B14F-4D97-AF65-F5344CB8AC3E}">
         <p14:creationId xmlns:p14="http://schemas.microsoft.com/office/powerpoint/2010/main" val="1495025901"/>
+      </p:ext>
+    </p:extLst>
+  </p:cSld>
+  <p:clrMapOvr>
+    <a:masterClrMapping/>
+  </p:clrMapOvr>
+</p:sld>
+</file>
+
+<file path=ppt/slides/slide5.xml><?xml version="1.0" encoding="utf-8"?>
+<p:sld xmlns:a="http://schemas.openxmlformats.org/drawingml/2006/main" xmlns:r="http://schemas.openxmlformats.org/officeDocument/2006/relationships" xmlns:p="http://schemas.openxmlformats.org/presentationml/2006/main">
+  <p:cSld>
+    <p:spTree>
+      <p:nvGrpSpPr>
+        <p:cNvPr id="1" name=""/>
+        <p:cNvGrpSpPr/>
+        <p:nvPr/>
+      </p:nvGrpSpPr>
+      <p:grpSpPr>
+        <a:xfrm>
+          <a:off x="0" y="0"/>
+          <a:ext cx="0" cy="0"/>
+          <a:chOff x="0" y="0"/>
+          <a:chExt cx="0" cy="0"/>
+        </a:xfrm>
+      </p:grpSpPr>
+      <p:sp>
+        <p:nvSpPr>
+          <p:cNvPr id="2" name="Title 1">
+            <a:extLst>
+              <a:ext uri="{FF2B5EF4-FFF2-40B4-BE49-F238E27FC236}">
+                <a16:creationId xmlns:a16="http://schemas.microsoft.com/office/drawing/2014/main" id="{08A79F15-2337-17FE-60E3-34980471A871}"/>
+              </a:ext>
+            </a:extLst>
+          </p:cNvPr>
+          <p:cNvSpPr>
+            <a:spLocks noGrp="1"/>
+          </p:cNvSpPr>
+          <p:nvPr>
+            <p:ph type="title"/>
+          </p:nvPr>
+        </p:nvSpPr>
+        <p:spPr/>
+        <p:txBody>
+          <a:bodyPr/>
+          <a:lstStyle/>
+          <a:p>
+            <a:r>
+              <a:rPr lang="en-GB" dirty="0"/>
+              <a:t>First validate than execute</a:t>
+            </a:r>
+          </a:p>
+        </p:txBody>
+      </p:sp>
+      <p:sp>
+        <p:nvSpPr>
+          <p:cNvPr id="3" name="Rectangle 2">
+            <a:extLst>
+              <a:ext uri="{FF2B5EF4-FFF2-40B4-BE49-F238E27FC236}">
+                <a16:creationId xmlns:a16="http://schemas.microsoft.com/office/drawing/2014/main" id="{424EE509-96EB-CBAD-25C7-FCCCCFB33806}"/>
+              </a:ext>
+            </a:extLst>
+          </p:cNvPr>
+          <p:cNvSpPr/>
+          <p:nvPr/>
+        </p:nvSpPr>
+        <p:spPr>
+          <a:xfrm>
+            <a:off x="707010" y="3073138"/>
+            <a:ext cx="2007909" cy="1649691"/>
+          </a:xfrm>
+          <a:prstGeom prst="rect">
+            <a:avLst/>
+          </a:prstGeom>
+        </p:spPr>
+        <p:style>
+          <a:lnRef idx="2">
+            <a:schemeClr val="accent1">
+              <a:shade val="50000"/>
+            </a:schemeClr>
+          </a:lnRef>
+          <a:fillRef idx="1">
+            <a:schemeClr val="accent1"/>
+          </a:fillRef>
+          <a:effectRef idx="0">
+            <a:schemeClr val="accent1"/>
+          </a:effectRef>
+          <a:fontRef idx="minor">
+            <a:schemeClr val="lt1"/>
+          </a:fontRef>
+        </p:style>
+        <p:txBody>
+          <a:bodyPr rtlCol="0" anchor="ctr"/>
+          <a:lstStyle/>
+          <a:p>
+            <a:pPr algn="ctr"/>
+            <a:r>
+              <a:rPr lang="en-GB" dirty="0"/>
+              <a:t>Start execution </a:t>
+            </a:r>
+          </a:p>
+        </p:txBody>
+      </p:sp>
+      <p:cxnSp>
+        <p:nvCxnSpPr>
+          <p:cNvPr id="5" name="Straight Arrow Connector 4">
+            <a:extLst>
+              <a:ext uri="{FF2B5EF4-FFF2-40B4-BE49-F238E27FC236}">
+                <a16:creationId xmlns:a16="http://schemas.microsoft.com/office/drawing/2014/main" id="{39604DCA-ED73-8F06-4882-B80B54756C25}"/>
+              </a:ext>
+            </a:extLst>
+          </p:cNvPr>
+          <p:cNvCxnSpPr>
+            <a:cxnSpLocks/>
+          </p:cNvCxnSpPr>
+          <p:nvPr/>
+        </p:nvCxnSpPr>
+        <p:spPr>
+          <a:xfrm>
+            <a:off x="2892719" y="3897982"/>
+            <a:ext cx="509047" cy="0"/>
+          </a:xfrm>
+          <a:prstGeom prst="straightConnector1">
+            <a:avLst/>
+          </a:prstGeom>
+          <a:ln>
+            <a:tailEnd type="triangle"/>
+          </a:ln>
+        </p:spPr>
+        <p:style>
+          <a:lnRef idx="1">
+            <a:schemeClr val="accent1"/>
+          </a:lnRef>
+          <a:fillRef idx="0">
+            <a:schemeClr val="accent1"/>
+          </a:fillRef>
+          <a:effectRef idx="0">
+            <a:schemeClr val="accent1"/>
+          </a:effectRef>
+          <a:fontRef idx="minor">
+            <a:schemeClr val="tx1"/>
+          </a:fontRef>
+        </p:style>
+      </p:cxnSp>
+      <p:sp>
+        <p:nvSpPr>
+          <p:cNvPr id="7" name="Rectangle 6">
+            <a:extLst>
+              <a:ext uri="{FF2B5EF4-FFF2-40B4-BE49-F238E27FC236}">
+                <a16:creationId xmlns:a16="http://schemas.microsoft.com/office/drawing/2014/main" id="{548F8812-7A40-F6E9-CF9D-80811D03B664}"/>
+              </a:ext>
+            </a:extLst>
+          </p:cNvPr>
+          <p:cNvSpPr/>
+          <p:nvPr/>
+        </p:nvSpPr>
+        <p:spPr>
+          <a:xfrm>
+            <a:off x="3579566" y="3073136"/>
+            <a:ext cx="2007909" cy="1649691"/>
+          </a:xfrm>
+          <a:prstGeom prst="rect">
+            <a:avLst/>
+          </a:prstGeom>
+        </p:spPr>
+        <p:style>
+          <a:lnRef idx="2">
+            <a:schemeClr val="accent1">
+              <a:shade val="50000"/>
+            </a:schemeClr>
+          </a:lnRef>
+          <a:fillRef idx="1">
+            <a:schemeClr val="accent1"/>
+          </a:fillRef>
+          <a:effectRef idx="0">
+            <a:schemeClr val="accent1"/>
+          </a:effectRef>
+          <a:fontRef idx="minor">
+            <a:schemeClr val="lt1"/>
+          </a:fontRef>
+        </p:style>
+        <p:txBody>
+          <a:bodyPr rtlCol="0" anchor="ctr"/>
+          <a:lstStyle/>
+          <a:p>
+            <a:pPr algn="ctr"/>
+            <a:r>
+              <a:rPr lang="en-GB" dirty="0"/>
+              <a:t>Validate if all steps are available</a:t>
+            </a:r>
+          </a:p>
+        </p:txBody>
+      </p:sp>
+      <p:sp>
+        <p:nvSpPr>
+          <p:cNvPr id="8" name="Rectangle 7">
+            <a:extLst>
+              <a:ext uri="{FF2B5EF4-FFF2-40B4-BE49-F238E27FC236}">
+                <a16:creationId xmlns:a16="http://schemas.microsoft.com/office/drawing/2014/main" id="{315AA8B0-E527-E950-E56F-6032E7C82FFF}"/>
+              </a:ext>
+            </a:extLst>
+          </p:cNvPr>
+          <p:cNvSpPr/>
+          <p:nvPr/>
+        </p:nvSpPr>
+        <p:spPr>
+          <a:xfrm>
+            <a:off x="6452122" y="3073136"/>
+            <a:ext cx="2007909" cy="1649691"/>
+          </a:xfrm>
+          <a:prstGeom prst="rect">
+            <a:avLst/>
+          </a:prstGeom>
+        </p:spPr>
+        <p:style>
+          <a:lnRef idx="2">
+            <a:schemeClr val="accent1">
+              <a:shade val="50000"/>
+            </a:schemeClr>
+          </a:lnRef>
+          <a:fillRef idx="1">
+            <a:schemeClr val="accent1"/>
+          </a:fillRef>
+          <a:effectRef idx="0">
+            <a:schemeClr val="accent1"/>
+          </a:effectRef>
+          <a:fontRef idx="minor">
+            <a:schemeClr val="lt1"/>
+          </a:fontRef>
+        </p:style>
+        <p:txBody>
+          <a:bodyPr rtlCol="0" anchor="ctr"/>
+          <a:lstStyle/>
+          <a:p>
+            <a:pPr algn="ctr"/>
+            <a:r>
+              <a:rPr lang="en-GB" dirty="0"/>
+              <a:t>Validate if all steps have the necessary input</a:t>
+            </a:r>
+          </a:p>
+        </p:txBody>
+      </p:sp>
+      <p:sp>
+        <p:nvSpPr>
+          <p:cNvPr id="10" name="Rectangle 9">
+            <a:extLst>
+              <a:ext uri="{FF2B5EF4-FFF2-40B4-BE49-F238E27FC236}">
+                <a16:creationId xmlns:a16="http://schemas.microsoft.com/office/drawing/2014/main" id="{9DEC2B1D-A52E-8AAC-E609-68D8DF31BD79}"/>
+              </a:ext>
+            </a:extLst>
+          </p:cNvPr>
+          <p:cNvSpPr/>
+          <p:nvPr/>
+        </p:nvSpPr>
+        <p:spPr>
+          <a:xfrm>
+            <a:off x="9324680" y="3073135"/>
+            <a:ext cx="2007909" cy="1649691"/>
+          </a:xfrm>
+          <a:prstGeom prst="rect">
+            <a:avLst/>
+          </a:prstGeom>
+        </p:spPr>
+        <p:style>
+          <a:lnRef idx="2">
+            <a:schemeClr val="accent1">
+              <a:shade val="50000"/>
+            </a:schemeClr>
+          </a:lnRef>
+          <a:fillRef idx="1">
+            <a:schemeClr val="accent1"/>
+          </a:fillRef>
+          <a:effectRef idx="0">
+            <a:schemeClr val="accent1"/>
+          </a:effectRef>
+          <a:fontRef idx="minor">
+            <a:schemeClr val="lt1"/>
+          </a:fontRef>
+        </p:style>
+        <p:txBody>
+          <a:bodyPr rtlCol="0" anchor="ctr"/>
+          <a:lstStyle/>
+          <a:p>
+            <a:pPr algn="ctr"/>
+            <a:r>
+              <a:rPr lang="en-GB" dirty="0"/>
+              <a:t>Execute workflow</a:t>
+            </a:r>
+          </a:p>
+        </p:txBody>
+      </p:sp>
+      <p:cxnSp>
+        <p:nvCxnSpPr>
+          <p:cNvPr id="11" name="Straight Arrow Connector 10">
+            <a:extLst>
+              <a:ext uri="{FF2B5EF4-FFF2-40B4-BE49-F238E27FC236}">
+                <a16:creationId xmlns:a16="http://schemas.microsoft.com/office/drawing/2014/main" id="{84E2E4A9-1756-B19C-5E3C-288A7BE78BA7}"/>
+              </a:ext>
+            </a:extLst>
+          </p:cNvPr>
+          <p:cNvCxnSpPr>
+            <a:cxnSpLocks/>
+          </p:cNvCxnSpPr>
+          <p:nvPr/>
+        </p:nvCxnSpPr>
+        <p:spPr>
+          <a:xfrm>
+            <a:off x="5765275" y="3874411"/>
+            <a:ext cx="509047" cy="0"/>
+          </a:xfrm>
+          <a:prstGeom prst="straightConnector1">
+            <a:avLst/>
+          </a:prstGeom>
+          <a:ln>
+            <a:tailEnd type="triangle"/>
+          </a:ln>
+        </p:spPr>
+        <p:style>
+          <a:lnRef idx="1">
+            <a:schemeClr val="accent1"/>
+          </a:lnRef>
+          <a:fillRef idx="0">
+            <a:schemeClr val="accent1"/>
+          </a:fillRef>
+          <a:effectRef idx="0">
+            <a:schemeClr val="accent1"/>
+          </a:effectRef>
+          <a:fontRef idx="minor">
+            <a:schemeClr val="tx1"/>
+          </a:fontRef>
+        </p:style>
+      </p:cxnSp>
+      <p:cxnSp>
+        <p:nvCxnSpPr>
+          <p:cNvPr id="12" name="Straight Arrow Connector 11">
+            <a:extLst>
+              <a:ext uri="{FF2B5EF4-FFF2-40B4-BE49-F238E27FC236}">
+                <a16:creationId xmlns:a16="http://schemas.microsoft.com/office/drawing/2014/main" id="{2A3ABDAE-3150-CF90-1A26-E366ED56895F}"/>
+              </a:ext>
+            </a:extLst>
+          </p:cNvPr>
+          <p:cNvCxnSpPr>
+            <a:cxnSpLocks/>
+          </p:cNvCxnSpPr>
+          <p:nvPr/>
+        </p:nvCxnSpPr>
+        <p:spPr>
+          <a:xfrm>
+            <a:off x="8637831" y="3897980"/>
+            <a:ext cx="509047" cy="0"/>
+          </a:xfrm>
+          <a:prstGeom prst="straightConnector1">
+            <a:avLst/>
+          </a:prstGeom>
+          <a:ln>
+            <a:tailEnd type="triangle"/>
+          </a:ln>
+        </p:spPr>
+        <p:style>
+          <a:lnRef idx="1">
+            <a:schemeClr val="accent1"/>
+          </a:lnRef>
+          <a:fillRef idx="0">
+            <a:schemeClr val="accent1"/>
+          </a:fillRef>
+          <a:effectRef idx="0">
+            <a:schemeClr val="accent1"/>
+          </a:effectRef>
+          <a:fontRef idx="minor">
+            <a:schemeClr val="tx1"/>
+          </a:fontRef>
+        </p:style>
+      </p:cxnSp>
+      <p:sp>
+        <p:nvSpPr>
+          <p:cNvPr id="13" name="TextBox 12">
+            <a:extLst>
+              <a:ext uri="{FF2B5EF4-FFF2-40B4-BE49-F238E27FC236}">
+                <a16:creationId xmlns:a16="http://schemas.microsoft.com/office/drawing/2014/main" id="{17FD0F19-C8C6-69ED-8C7D-B63EFC83E41B}"/>
+              </a:ext>
+            </a:extLst>
+          </p:cNvPr>
+          <p:cNvSpPr txBox="1"/>
+          <p:nvPr/>
+        </p:nvSpPr>
+        <p:spPr>
+          <a:xfrm>
+            <a:off x="3657600" y="5062194"/>
+            <a:ext cx="2177592" cy="923330"/>
+          </a:xfrm>
+          <a:prstGeom prst="rect">
+            <a:avLst/>
+          </a:prstGeom>
+          <a:noFill/>
+        </p:spPr>
+        <p:txBody>
+          <a:bodyPr wrap="square" rtlCol="0">
+            <a:spAutoFit/>
+          </a:bodyPr>
+          <a:lstStyle/>
+          <a:p>
+            <a:r>
+              <a:rPr lang="nl-NL" dirty="0" err="1"/>
+              <a:t>To</a:t>
+            </a:r>
+            <a:r>
+              <a:rPr lang="nl-NL" dirty="0"/>
+              <a:t> </a:t>
+            </a:r>
+            <a:r>
+              <a:rPr lang="nl-NL" dirty="0" err="1"/>
+              <a:t>give</a:t>
+            </a:r>
+            <a:r>
+              <a:rPr lang="nl-NL" dirty="0"/>
+              <a:t> a </a:t>
+            </a:r>
+            <a:r>
+              <a:rPr lang="nl-NL" dirty="0" err="1"/>
+              <a:t>quick</a:t>
+            </a:r>
+            <a:r>
+              <a:rPr lang="nl-NL" dirty="0"/>
+              <a:t> response </a:t>
+            </a:r>
+            <a:r>
+              <a:rPr lang="nl-NL" dirty="0" err="1"/>
+              <a:t>if</a:t>
+            </a:r>
+            <a:r>
+              <a:rPr lang="nl-NL" dirty="0"/>
+              <a:t> </a:t>
+            </a:r>
+            <a:r>
+              <a:rPr lang="nl-NL" dirty="0" err="1"/>
+              <a:t>something</a:t>
+            </a:r>
+            <a:r>
+              <a:rPr lang="nl-NL" dirty="0"/>
+              <a:t> is missing</a:t>
+            </a:r>
+            <a:endParaRPr lang="en-NL" dirty="0"/>
+          </a:p>
+        </p:txBody>
+      </p:sp>
+      <p:sp>
+        <p:nvSpPr>
+          <p:cNvPr id="14" name="TextBox 13">
+            <a:extLst>
+              <a:ext uri="{FF2B5EF4-FFF2-40B4-BE49-F238E27FC236}">
+                <a16:creationId xmlns:a16="http://schemas.microsoft.com/office/drawing/2014/main" id="{1707B17C-C27C-9653-AE9F-EAC2019C2252}"/>
+              </a:ext>
+            </a:extLst>
+          </p:cNvPr>
+          <p:cNvSpPr txBox="1"/>
+          <p:nvPr/>
+        </p:nvSpPr>
+        <p:spPr>
+          <a:xfrm>
+            <a:off x="6395562" y="5071622"/>
+            <a:ext cx="2177592" cy="1477328"/>
+          </a:xfrm>
+          <a:prstGeom prst="rect">
+            <a:avLst/>
+          </a:prstGeom>
+          <a:noFill/>
+        </p:spPr>
+        <p:txBody>
+          <a:bodyPr wrap="square" rtlCol="0">
+            <a:spAutoFit/>
+          </a:bodyPr>
+          <a:lstStyle/>
+          <a:p>
+            <a:r>
+              <a:rPr lang="nl-NL" dirty="0" err="1"/>
+              <a:t>Execute</a:t>
+            </a:r>
+            <a:r>
+              <a:rPr lang="nl-NL" dirty="0"/>
+              <a:t> without </a:t>
+            </a:r>
+            <a:r>
+              <a:rPr lang="nl-NL" dirty="0" err="1"/>
+              <a:t>modifying</a:t>
+            </a:r>
+            <a:r>
+              <a:rPr lang="nl-NL" dirty="0"/>
+              <a:t> systems.</a:t>
+            </a:r>
+          </a:p>
+          <a:p>
+            <a:r>
+              <a:rPr lang="nl-NL" dirty="0"/>
+              <a:t>Check input </a:t>
+            </a:r>
+            <a:r>
+              <a:rPr lang="nl-NL" dirty="0" err="1"/>
+              <a:t>and</a:t>
+            </a:r>
+            <a:r>
+              <a:rPr lang="nl-NL" dirty="0"/>
+              <a:t> </a:t>
+            </a:r>
+            <a:r>
+              <a:rPr lang="nl-NL" dirty="0" err="1"/>
+              <a:t>gives</a:t>
+            </a:r>
+            <a:r>
+              <a:rPr lang="nl-NL" dirty="0"/>
+              <a:t> output </a:t>
+            </a:r>
+            <a:r>
+              <a:rPr lang="nl-NL" dirty="0" err="1"/>
+              <a:t>for</a:t>
+            </a:r>
+            <a:r>
+              <a:rPr lang="nl-NL" dirty="0"/>
+              <a:t> next steps</a:t>
+            </a:r>
+            <a:endParaRPr lang="en-NL" dirty="0"/>
+          </a:p>
+        </p:txBody>
+      </p:sp>
+      <p:sp>
+        <p:nvSpPr>
+          <p:cNvPr id="15" name="TextBox 14">
+            <a:extLst>
+              <a:ext uri="{FF2B5EF4-FFF2-40B4-BE49-F238E27FC236}">
+                <a16:creationId xmlns:a16="http://schemas.microsoft.com/office/drawing/2014/main" id="{D34BEC13-3831-FC2C-D297-AFF18A8D20C3}"/>
+              </a:ext>
+            </a:extLst>
+          </p:cNvPr>
+          <p:cNvSpPr txBox="1"/>
+          <p:nvPr/>
+        </p:nvSpPr>
+        <p:spPr>
+          <a:xfrm>
+            <a:off x="9239838" y="5015547"/>
+            <a:ext cx="2177592" cy="646331"/>
+          </a:xfrm>
+          <a:prstGeom prst="rect">
+            <a:avLst/>
+          </a:prstGeom>
+          <a:noFill/>
+        </p:spPr>
+        <p:txBody>
+          <a:bodyPr wrap="square" rtlCol="0">
+            <a:spAutoFit/>
+          </a:bodyPr>
+          <a:lstStyle/>
+          <a:p>
+            <a:r>
+              <a:rPr lang="nl-NL" dirty="0" err="1"/>
+              <a:t>Executes</a:t>
+            </a:r>
+            <a:r>
+              <a:rPr lang="nl-NL" dirty="0"/>
+              <a:t> </a:t>
+            </a:r>
+            <a:r>
+              <a:rPr lang="nl-NL" dirty="0" err="1"/>
+              <a:t>the</a:t>
+            </a:r>
+            <a:r>
+              <a:rPr lang="nl-NL" dirty="0"/>
+              <a:t> workflow</a:t>
+            </a:r>
+            <a:endParaRPr lang="en-NL" dirty="0"/>
+          </a:p>
+        </p:txBody>
+      </p:sp>
+      <p:sp>
+        <p:nvSpPr>
+          <p:cNvPr id="16" name="TextBox 15">
+            <a:extLst>
+              <a:ext uri="{FF2B5EF4-FFF2-40B4-BE49-F238E27FC236}">
+                <a16:creationId xmlns:a16="http://schemas.microsoft.com/office/drawing/2014/main" id="{3B0DEFA3-2ACE-6951-EBD9-FB85BF61BA84}"/>
+              </a:ext>
+            </a:extLst>
+          </p:cNvPr>
+          <p:cNvSpPr txBox="1"/>
+          <p:nvPr/>
+        </p:nvSpPr>
+        <p:spPr>
+          <a:xfrm>
+            <a:off x="989813" y="1451728"/>
+            <a:ext cx="5674937" cy="1200329"/>
+          </a:xfrm>
+          <a:prstGeom prst="rect">
+            <a:avLst/>
+          </a:prstGeom>
+          <a:noFill/>
+        </p:spPr>
+        <p:txBody>
+          <a:bodyPr wrap="square" rtlCol="0">
+            <a:spAutoFit/>
+          </a:bodyPr>
+          <a:lstStyle/>
+          <a:p>
+            <a:r>
+              <a:rPr lang="nl-NL" dirty="0" err="1"/>
+              <a:t>Still</a:t>
+            </a:r>
+            <a:r>
+              <a:rPr lang="nl-NL" dirty="0"/>
+              <a:t> </a:t>
+            </a:r>
+            <a:r>
+              <a:rPr lang="nl-NL" dirty="0" err="1"/>
+              <a:t>to</a:t>
+            </a:r>
+            <a:r>
+              <a:rPr lang="nl-NL" dirty="0"/>
+              <a:t> do:</a:t>
+            </a:r>
+          </a:p>
+          <a:p>
+            <a:pPr marL="285750" indent="-285750">
+              <a:buFont typeface="Arial" panose="020B0604020202020204" pitchFamily="34" charset="0"/>
+              <a:buChar char="•"/>
+            </a:pPr>
+            <a:r>
+              <a:rPr lang="nl-NL" dirty="0"/>
+              <a:t>A lot of console logs -&gt; </a:t>
+            </a:r>
+            <a:r>
+              <a:rPr lang="nl-NL" dirty="0" err="1"/>
+              <a:t>should</a:t>
+            </a:r>
+            <a:r>
+              <a:rPr lang="nl-NL" dirty="0"/>
+              <a:t> </a:t>
+            </a:r>
+            <a:r>
+              <a:rPr lang="nl-NL" dirty="0" err="1"/>
+              <a:t>be</a:t>
+            </a:r>
+            <a:r>
+              <a:rPr lang="nl-NL" dirty="0"/>
+              <a:t> </a:t>
+            </a:r>
+            <a:r>
+              <a:rPr lang="nl-NL" dirty="0" err="1"/>
+              <a:t>saved</a:t>
+            </a:r>
+            <a:r>
+              <a:rPr lang="nl-NL" dirty="0"/>
+              <a:t> in </a:t>
+            </a:r>
+            <a:r>
+              <a:rPr lang="nl-NL" dirty="0" err="1"/>
+              <a:t>SQLite</a:t>
+            </a:r>
+            <a:endParaRPr lang="nl-NL" dirty="0"/>
+          </a:p>
+          <a:p>
+            <a:pPr marL="285750" indent="-285750">
+              <a:buFont typeface="Arial" panose="020B0604020202020204" pitchFamily="34" charset="0"/>
+              <a:buChar char="•"/>
+            </a:pPr>
+            <a:r>
+              <a:rPr lang="nl-NL" dirty="0" err="1"/>
+              <a:t>Not</a:t>
+            </a:r>
+            <a:r>
+              <a:rPr lang="nl-NL" dirty="0"/>
+              <a:t> </a:t>
+            </a:r>
+            <a:r>
+              <a:rPr lang="nl-NL" dirty="0" err="1"/>
+              <a:t>checking</a:t>
+            </a:r>
+            <a:r>
+              <a:rPr lang="nl-NL" dirty="0"/>
+              <a:t> </a:t>
+            </a:r>
+            <a:r>
+              <a:rPr lang="nl-NL" dirty="0" err="1"/>
+              <a:t>if</a:t>
+            </a:r>
+            <a:r>
+              <a:rPr lang="nl-NL" dirty="0"/>
+              <a:t> </a:t>
+            </a:r>
+            <a:r>
+              <a:rPr lang="nl-NL" dirty="0" err="1"/>
+              <a:t>the</a:t>
+            </a:r>
+            <a:r>
+              <a:rPr lang="nl-NL" dirty="0"/>
+              <a:t> data is of correct data types</a:t>
+            </a:r>
+          </a:p>
+          <a:p>
+            <a:pPr marL="285750" indent="-285750">
+              <a:buFont typeface="Arial" panose="020B0604020202020204" pitchFamily="34" charset="0"/>
+              <a:buChar char="•"/>
+            </a:pPr>
+            <a:endParaRPr lang="en-NL" dirty="0"/>
+          </a:p>
+        </p:txBody>
+      </p:sp>
+    </p:spTree>
+    <p:extLst>
+      <p:ext uri="{BB962C8B-B14F-4D97-AF65-F5344CB8AC3E}">
+        <p14:creationId xmlns:p14="http://schemas.microsoft.com/office/powerpoint/2010/main" val="2350029969"/>
+      </p:ext>
+    </p:extLst>
+  </p:cSld>
+  <p:clrMapOvr>
+    <a:masterClrMapping/>
+  </p:clrMapOvr>
+</p:sld>
+</file>
+
+<file path=ppt/slides/slide6.xml><?xml version="1.0" encoding="utf-8"?>
+<p:sld xmlns:a="http://schemas.openxmlformats.org/drawingml/2006/main" xmlns:r="http://schemas.openxmlformats.org/officeDocument/2006/relationships" xmlns:p="http://schemas.openxmlformats.org/presentationml/2006/main">
+  <p:cSld>
+    <p:spTree>
+      <p:nvGrpSpPr>
+        <p:cNvPr id="1" name=""/>
+        <p:cNvGrpSpPr/>
+        <p:nvPr/>
+      </p:nvGrpSpPr>
+      <p:grpSpPr>
+        <a:xfrm>
+          <a:off x="0" y="0"/>
+          <a:ext cx="0" cy="0"/>
+          <a:chOff x="0" y="0"/>
+          <a:chExt cx="0" cy="0"/>
+        </a:xfrm>
+      </p:grpSpPr>
+      <p:sp>
+        <p:nvSpPr>
+          <p:cNvPr id="2" name="Title 1">
+            <a:extLst>
+              <a:ext uri="{FF2B5EF4-FFF2-40B4-BE49-F238E27FC236}">
+                <a16:creationId xmlns:a16="http://schemas.microsoft.com/office/drawing/2014/main" id="{08A79F15-2337-17FE-60E3-34980471A871}"/>
+              </a:ext>
+            </a:extLst>
+          </p:cNvPr>
+          <p:cNvSpPr>
+            <a:spLocks noGrp="1"/>
+          </p:cNvSpPr>
+          <p:nvPr>
+            <p:ph type="title"/>
+          </p:nvPr>
+        </p:nvSpPr>
+        <p:spPr/>
+        <p:txBody>
+          <a:bodyPr/>
+          <a:lstStyle/>
+          <a:p>
+            <a:r>
+              <a:rPr lang="en-GB" dirty="0"/>
+              <a:t>Store data in a smart and reliable way </a:t>
+            </a:r>
+          </a:p>
+        </p:txBody>
+      </p:sp>
+      <p:sp>
+        <p:nvSpPr>
+          <p:cNvPr id="16" name="TextBox 15">
+            <a:extLst>
+              <a:ext uri="{FF2B5EF4-FFF2-40B4-BE49-F238E27FC236}">
+                <a16:creationId xmlns:a16="http://schemas.microsoft.com/office/drawing/2014/main" id="{3B0DEFA3-2ACE-6951-EBD9-FB85BF61BA84}"/>
+              </a:ext>
+            </a:extLst>
+          </p:cNvPr>
+          <p:cNvSpPr txBox="1"/>
+          <p:nvPr/>
+        </p:nvSpPr>
+        <p:spPr>
+          <a:xfrm>
+            <a:off x="838200" y="1998483"/>
+            <a:ext cx="5674937" cy="3139321"/>
+          </a:xfrm>
+          <a:prstGeom prst="rect">
+            <a:avLst/>
+          </a:prstGeom>
+          <a:noFill/>
+        </p:spPr>
+        <p:txBody>
+          <a:bodyPr wrap="square" rtlCol="0">
+            <a:spAutoFit/>
+          </a:bodyPr>
+          <a:lstStyle/>
+          <a:p>
+            <a:r>
+              <a:rPr lang="en-GB" b="1" dirty="0"/>
+              <a:t>Current construction:</a:t>
+            </a:r>
+          </a:p>
+          <a:p>
+            <a:r>
+              <a:rPr lang="en-GB" dirty="0"/>
+              <a:t>Object that saved a context values and overwrites if the name is the same</a:t>
+            </a:r>
+          </a:p>
+          <a:p>
+            <a:endParaRPr lang="en-GB" dirty="0"/>
+          </a:p>
+          <a:p>
+            <a:r>
+              <a:rPr lang="en-GB" b="1" dirty="0"/>
+              <a:t>Better solution:</a:t>
+            </a:r>
+          </a:p>
+          <a:p>
+            <a:r>
+              <a:rPr lang="en-GB" dirty="0"/>
+              <a:t>Instance of an context class with getters and setters that protect data types. Here we could also define clear data structures in the </a:t>
+            </a:r>
+            <a:r>
+              <a:rPr lang="en-GB" dirty="0" err="1"/>
+              <a:t>workflowStep</a:t>
+            </a:r>
+            <a:r>
+              <a:rPr lang="en-GB" dirty="0"/>
+              <a:t> class of the input objects to validate key values.</a:t>
+            </a:r>
+          </a:p>
+          <a:p>
+            <a:endParaRPr lang="en-GB" dirty="0"/>
+          </a:p>
+          <a:p>
+            <a:endParaRPr lang="en-GB" dirty="0"/>
+          </a:p>
+        </p:txBody>
+      </p:sp>
+    </p:spTree>
+    <p:extLst>
+      <p:ext uri="{BB962C8B-B14F-4D97-AF65-F5344CB8AC3E}">
+        <p14:creationId xmlns:p14="http://schemas.microsoft.com/office/powerpoint/2010/main" val="3511042916"/>
+      </p:ext>
+    </p:extLst>
+  </p:cSld>
+  <p:clrMapOvr>
+    <a:masterClrMapping/>
+  </p:clrMapOvr>
+</p:sld>
+</file>
+
+<file path=ppt/slides/slide7.xml><?xml version="1.0" encoding="utf-8"?>
+<p:sld xmlns:a="http://schemas.openxmlformats.org/drawingml/2006/main" xmlns:r="http://schemas.openxmlformats.org/officeDocument/2006/relationships" xmlns:p="http://schemas.openxmlformats.org/presentationml/2006/main">
+  <p:cSld>
+    <p:spTree>
+      <p:nvGrpSpPr>
+        <p:cNvPr id="1" name=""/>
+        <p:cNvGrpSpPr/>
+        <p:nvPr/>
+      </p:nvGrpSpPr>
+      <p:grpSpPr>
+        <a:xfrm>
+          <a:off x="0" y="0"/>
+          <a:ext cx="0" cy="0"/>
+          <a:chOff x="0" y="0"/>
+          <a:chExt cx="0" cy="0"/>
+        </a:xfrm>
+      </p:grpSpPr>
+      <p:sp>
+        <p:nvSpPr>
+          <p:cNvPr id="2" name="Title 1">
+            <a:extLst>
+              <a:ext uri="{FF2B5EF4-FFF2-40B4-BE49-F238E27FC236}">
+                <a16:creationId xmlns:a16="http://schemas.microsoft.com/office/drawing/2014/main" id="{3777ED27-B9F6-32E6-2EB5-D1CCDF23119B}"/>
+              </a:ext>
+            </a:extLst>
+          </p:cNvPr>
+          <p:cNvSpPr>
+            <a:spLocks noGrp="1"/>
+          </p:cNvSpPr>
+          <p:nvPr>
+            <p:ph type="title"/>
+          </p:nvPr>
+        </p:nvSpPr>
+        <p:spPr/>
+        <p:txBody>
+          <a:bodyPr>
+            <a:normAutofit/>
+          </a:bodyPr>
+          <a:lstStyle/>
+          <a:p>
+            <a:r>
+              <a:rPr lang="en-GB" dirty="0"/>
+              <a:t>Modular module build</a:t>
+            </a:r>
+            <a:endParaRPr lang="en-NL" dirty="0"/>
+          </a:p>
+        </p:txBody>
+      </p:sp>
+      <p:sp>
+        <p:nvSpPr>
+          <p:cNvPr id="3" name="Content Placeholder 2">
+            <a:extLst>
+              <a:ext uri="{FF2B5EF4-FFF2-40B4-BE49-F238E27FC236}">
+                <a16:creationId xmlns:a16="http://schemas.microsoft.com/office/drawing/2014/main" id="{84AC0FEA-00C3-4521-4098-5BFD4742A8A8}"/>
+              </a:ext>
+            </a:extLst>
+          </p:cNvPr>
+          <p:cNvSpPr>
+            <a:spLocks noGrp="1"/>
+          </p:cNvSpPr>
+          <p:nvPr>
+            <p:ph idx="1"/>
+          </p:nvPr>
+        </p:nvSpPr>
+        <p:spPr>
+          <a:xfrm>
+            <a:off x="838200" y="1825625"/>
+            <a:ext cx="6976621" cy="4773138"/>
+          </a:xfrm>
+        </p:spPr>
+        <p:txBody>
+          <a:bodyPr>
+            <a:normAutofit/>
+          </a:bodyPr>
+          <a:lstStyle/>
+          <a:p>
+            <a:pPr marL="0" indent="0">
+              <a:buNone/>
+            </a:pPr>
+            <a:r>
+              <a:rPr lang="nl-NL" sz="1800" dirty="0"/>
+              <a:t>Easy </a:t>
+            </a:r>
+            <a:r>
+              <a:rPr lang="nl-NL" sz="1800" dirty="0" err="1"/>
+              <a:t>to</a:t>
+            </a:r>
+            <a:r>
+              <a:rPr lang="nl-NL" sz="1800" dirty="0"/>
+              <a:t> add new </a:t>
+            </a:r>
+            <a:r>
+              <a:rPr lang="nl-NL" sz="1800" dirty="0" err="1"/>
+              <a:t>workflows</a:t>
+            </a:r>
+            <a:r>
+              <a:rPr lang="nl-NL" sz="1800" dirty="0"/>
+              <a:t> </a:t>
+            </a:r>
+            <a:r>
+              <a:rPr lang="nl-NL" sz="1800" dirty="0" err="1"/>
+              <a:t>and</a:t>
+            </a:r>
+            <a:r>
+              <a:rPr lang="nl-NL" sz="1800" dirty="0"/>
+              <a:t> </a:t>
+            </a:r>
+            <a:r>
+              <a:rPr lang="nl-NL" sz="1800" dirty="0" err="1"/>
+              <a:t>workflowSteps</a:t>
+            </a:r>
+            <a:r>
+              <a:rPr lang="nl-NL" sz="1800" dirty="0"/>
+              <a:t>:</a:t>
+            </a:r>
+          </a:p>
+          <a:p>
+            <a:endParaRPr lang="nl-NL" sz="1800" dirty="0"/>
+          </a:p>
+          <a:p>
+            <a:pPr marL="0" indent="0">
+              <a:buNone/>
+            </a:pPr>
+            <a:r>
+              <a:rPr lang="nl-NL" sz="1800" dirty="0" err="1"/>
+              <a:t>workflows</a:t>
+            </a:r>
+            <a:r>
+              <a:rPr lang="nl-NL" sz="1800" dirty="0"/>
+              <a:t>:</a:t>
+            </a:r>
+          </a:p>
+          <a:p>
+            <a:pPr marL="0" indent="0">
+              <a:buNone/>
+            </a:pPr>
+            <a:r>
+              <a:rPr lang="en-GB" sz="1800" i="1" dirty="0"/>
+              <a:t>- Create a copy of </a:t>
+            </a:r>
+            <a:r>
+              <a:rPr lang="en-GB" sz="1800" i="1" dirty="0" err="1"/>
+              <a:t>src</a:t>
+            </a:r>
+            <a:r>
+              <a:rPr lang="en-GB" sz="1800" i="1" dirty="0"/>
+              <a:t>/workflows/</a:t>
+            </a:r>
+            <a:r>
+              <a:rPr lang="en-GB" sz="1800" i="1" dirty="0" err="1"/>
+              <a:t>templateWorkflow.ts</a:t>
+            </a:r>
+            <a:r>
+              <a:rPr lang="en-GB" sz="1800" i="1" dirty="0"/>
+              <a:t> and follow the steps in the file.</a:t>
+            </a:r>
+          </a:p>
+          <a:p>
+            <a:pPr marL="0" indent="0">
+              <a:buNone/>
+            </a:pPr>
+            <a:r>
+              <a:rPr lang="en-GB" sz="1800" i="1" dirty="0"/>
+              <a:t>- To run the workflow: </a:t>
+            </a:r>
+            <a:r>
+              <a:rPr lang="en-GB" sz="1800" i="1" dirty="0" err="1"/>
+              <a:t>ts</a:t>
+            </a:r>
+            <a:r>
+              <a:rPr lang="en-GB" sz="1800" i="1" dirty="0"/>
+              <a:t>-node ./</a:t>
+            </a:r>
+            <a:r>
+              <a:rPr lang="en-GB" sz="1800" i="1" dirty="0" err="1"/>
+              <a:t>src</a:t>
+            </a:r>
+            <a:r>
+              <a:rPr lang="en-GB" sz="1800" i="1" dirty="0"/>
+              <a:t>/workflows/</a:t>
+            </a:r>
+            <a:r>
+              <a:rPr lang="en-GB" sz="1800" i="1" dirty="0" err="1"/>
+              <a:t>fileName.ts</a:t>
+            </a:r>
+            <a:r>
+              <a:rPr lang="en-GB" sz="1800" i="1" dirty="0"/>
+              <a:t> (please change </a:t>
+            </a:r>
+            <a:r>
+              <a:rPr lang="en-GB" sz="1800" i="1" dirty="0" err="1"/>
+              <a:t>fileName</a:t>
+            </a:r>
+            <a:r>
+              <a:rPr lang="en-GB" sz="1800" i="1" dirty="0"/>
+              <a:t> to the new workflow).</a:t>
+            </a:r>
+          </a:p>
+          <a:p>
+            <a:pPr marL="0" indent="0">
+              <a:buNone/>
+            </a:pPr>
+            <a:endParaRPr lang="en-GB" sz="1800" i="1" dirty="0"/>
+          </a:p>
+          <a:p>
+            <a:pPr marL="0" indent="0">
+              <a:buNone/>
+            </a:pPr>
+            <a:r>
+              <a:rPr lang="en-GB" sz="1800" dirty="0" err="1"/>
+              <a:t>workflowSteps</a:t>
+            </a:r>
+            <a:r>
+              <a:rPr lang="en-GB" sz="1800" dirty="0"/>
+              <a:t>:</a:t>
+            </a:r>
+          </a:p>
+          <a:p>
+            <a:pPr marL="0" indent="0">
+              <a:buNone/>
+            </a:pPr>
+            <a:r>
+              <a:rPr lang="en-GB" sz="1800" dirty="0"/>
+              <a:t>- Create a copy of </a:t>
+            </a:r>
+            <a:r>
+              <a:rPr lang="en-GB" sz="1800" dirty="0" err="1"/>
+              <a:t>src</a:t>
+            </a:r>
+            <a:r>
+              <a:rPr lang="en-GB" sz="1800" dirty="0"/>
+              <a:t>/</a:t>
+            </a:r>
+            <a:r>
+              <a:rPr lang="en-GB" sz="1800" dirty="0" err="1"/>
+              <a:t>workflowSteps</a:t>
+            </a:r>
+            <a:r>
+              <a:rPr lang="en-GB" sz="1800" dirty="0"/>
+              <a:t>/</a:t>
+            </a:r>
+            <a:r>
+              <a:rPr lang="en-GB" sz="1800" dirty="0" err="1"/>
+              <a:t>templateWorkflowStep.ts</a:t>
+            </a:r>
+            <a:r>
+              <a:rPr lang="en-GB" sz="1800" dirty="0"/>
+              <a:t> and fill in the necessary methods.</a:t>
+            </a:r>
+          </a:p>
+          <a:p>
+            <a:pPr marL="0" indent="0">
+              <a:buNone/>
+            </a:pPr>
+            <a:r>
+              <a:rPr lang="en-GB" sz="1800" dirty="0"/>
+              <a:t>- Add the new class to </a:t>
+            </a:r>
+            <a:r>
+              <a:rPr lang="en-GB" sz="1800" dirty="0" err="1"/>
+              <a:t>src</a:t>
+            </a:r>
+            <a:r>
+              <a:rPr lang="en-GB" sz="1800" dirty="0"/>
+              <a:t>\</a:t>
+            </a:r>
+            <a:r>
+              <a:rPr lang="en-GB" sz="1800" dirty="0" err="1"/>
+              <a:t>workFlowSteps</a:t>
+            </a:r>
+            <a:r>
+              <a:rPr lang="en-GB" sz="1800" dirty="0"/>
+              <a:t>\</a:t>
+            </a:r>
+            <a:r>
+              <a:rPr lang="en-GB" sz="1800" dirty="0" err="1"/>
+              <a:t>StepClasses.ts</a:t>
+            </a:r>
+            <a:r>
+              <a:rPr lang="en-GB" sz="1800" dirty="0"/>
+              <a:t> so that the new class is available for the workflows</a:t>
+            </a:r>
+          </a:p>
+          <a:p>
+            <a:pPr marL="0" indent="0">
+              <a:buNone/>
+            </a:pPr>
+            <a:r>
+              <a:rPr lang="en-GB" sz="1800" dirty="0"/>
+              <a:t>- Add the new </a:t>
+            </a:r>
+            <a:r>
+              <a:rPr lang="en-GB" sz="1800" dirty="0" err="1"/>
+              <a:t>workFlowStep</a:t>
+            </a:r>
+            <a:r>
+              <a:rPr lang="en-GB" sz="1800" dirty="0"/>
+              <a:t> to a workflow</a:t>
+            </a:r>
+            <a:endParaRPr lang="en-NL" sz="1800" i="1" dirty="0"/>
+          </a:p>
+        </p:txBody>
+      </p:sp>
+      <p:pic>
+        <p:nvPicPr>
+          <p:cNvPr id="5" name="Picture 4">
+            <a:extLst>
+              <a:ext uri="{FF2B5EF4-FFF2-40B4-BE49-F238E27FC236}">
+                <a16:creationId xmlns:a16="http://schemas.microsoft.com/office/drawing/2014/main" id="{E13BBB3A-A41E-CF9D-D11F-4447DA744ABD}"/>
+              </a:ext>
+            </a:extLst>
+          </p:cNvPr>
+          <p:cNvPicPr>
+            <a:picLocks noChangeAspect="1"/>
+          </p:cNvPicPr>
+          <p:nvPr/>
+        </p:nvPicPr>
+        <p:blipFill>
+          <a:blip r:embed="rId2"/>
+          <a:stretch>
+            <a:fillRect/>
+          </a:stretch>
+        </p:blipFill>
+        <p:spPr>
+          <a:xfrm>
+            <a:off x="8436351" y="2105467"/>
+            <a:ext cx="3538489" cy="4031628"/>
+          </a:xfrm>
+          <a:prstGeom prst="rect">
+            <a:avLst/>
+          </a:prstGeom>
+        </p:spPr>
+      </p:pic>
+    </p:spTree>
+    <p:extLst>
+      <p:ext uri="{BB962C8B-B14F-4D97-AF65-F5344CB8AC3E}">
+        <p14:creationId xmlns:p14="http://schemas.microsoft.com/office/powerpoint/2010/main" val="980094004"/>
+      </p:ext>
+    </p:extLst>
+  </p:cSld>
+  <p:clrMapOvr>
+    <a:masterClrMapping/>
+  </p:clrMapOvr>
+</p:sld>
+</file>
+
+<file path=ppt/slides/slide8.xml><?xml version="1.0" encoding="utf-8"?>
+<p:sld xmlns:a="http://schemas.openxmlformats.org/drawingml/2006/main" xmlns:r="http://schemas.openxmlformats.org/officeDocument/2006/relationships" xmlns:p="http://schemas.openxmlformats.org/presentationml/2006/main">
+  <p:cSld>
+    <p:spTree>
+      <p:nvGrpSpPr>
+        <p:cNvPr id="1" name=""/>
+        <p:cNvGrpSpPr/>
+        <p:nvPr/>
+      </p:nvGrpSpPr>
+      <p:grpSpPr>
+        <a:xfrm>
+          <a:off x="0" y="0"/>
+          <a:ext cx="0" cy="0"/>
+          <a:chOff x="0" y="0"/>
+          <a:chExt cx="0" cy="0"/>
+        </a:xfrm>
+      </p:grpSpPr>
+      <p:sp>
+        <p:nvSpPr>
+          <p:cNvPr id="2" name="Title 1">
+            <a:extLst>
+              <a:ext uri="{FF2B5EF4-FFF2-40B4-BE49-F238E27FC236}">
+                <a16:creationId xmlns:a16="http://schemas.microsoft.com/office/drawing/2014/main" id="{08A79F15-2337-17FE-60E3-34980471A871}"/>
+              </a:ext>
+            </a:extLst>
+          </p:cNvPr>
+          <p:cNvSpPr>
+            <a:spLocks noGrp="1"/>
+          </p:cNvSpPr>
+          <p:nvPr>
+            <p:ph type="title"/>
+          </p:nvPr>
+        </p:nvSpPr>
+        <p:spPr/>
+        <p:txBody>
+          <a:bodyPr/>
+          <a:lstStyle/>
+          <a:p>
+            <a:r>
+              <a:rPr lang="en-GB" dirty="0"/>
+              <a:t>Things to add</a:t>
+            </a:r>
+          </a:p>
+        </p:txBody>
+      </p:sp>
+      <p:sp>
+        <p:nvSpPr>
+          <p:cNvPr id="16" name="TextBox 15">
+            <a:extLst>
+              <a:ext uri="{FF2B5EF4-FFF2-40B4-BE49-F238E27FC236}">
+                <a16:creationId xmlns:a16="http://schemas.microsoft.com/office/drawing/2014/main" id="{3B0DEFA3-2ACE-6951-EBD9-FB85BF61BA84}"/>
+              </a:ext>
+            </a:extLst>
+          </p:cNvPr>
+          <p:cNvSpPr txBox="1"/>
+          <p:nvPr/>
+        </p:nvSpPr>
+        <p:spPr>
+          <a:xfrm>
+            <a:off x="838200" y="1998483"/>
+            <a:ext cx="5674937" cy="1200329"/>
+          </a:xfrm>
+          <a:prstGeom prst="rect">
+            <a:avLst/>
+          </a:prstGeom>
+          <a:noFill/>
+        </p:spPr>
+        <p:txBody>
+          <a:bodyPr wrap="square" rtlCol="0">
+            <a:spAutoFit/>
+          </a:bodyPr>
+          <a:lstStyle/>
+          <a:p>
+            <a:r>
+              <a:rPr lang="en-GB" b="1" dirty="0"/>
+              <a:t>- Add tests for basic functionality</a:t>
+            </a:r>
+          </a:p>
+          <a:p>
+            <a:r>
+              <a:rPr lang="en-GB" b="1" dirty="0"/>
+              <a:t>- Add a SQLite / other method for execution logging</a:t>
+            </a:r>
+          </a:p>
+          <a:p>
+            <a:r>
+              <a:rPr lang="en-GB" b="1" dirty="0"/>
+              <a:t>- Create a generic way for field validation (and type of)</a:t>
+            </a:r>
+            <a:endParaRPr lang="en-GB" dirty="0"/>
+          </a:p>
+          <a:p>
+            <a:endParaRPr lang="en-GB" dirty="0"/>
+          </a:p>
+        </p:txBody>
+      </p:sp>
+    </p:spTree>
+    <p:extLst>
+      <p:ext uri="{BB962C8B-B14F-4D97-AF65-F5344CB8AC3E}">
+        <p14:creationId xmlns:p14="http://schemas.microsoft.com/office/powerpoint/2010/main" val="905714877"/>
       </p:ext>
     </p:extLst>
   </p:cSld>

</xml_diff>